<commit_message>
delete chapter3 & 5
</commit_message>
<xml_diff>
--- a/Slides/Part2-Modeling/Pressman_SEPA_9e_Ch014_PPT.pptx
+++ b/Slides/Part2-Modeling/Pressman_SEPA_9e_Ch014_PPT.pptx
@@ -6911,7 +6911,7 @@
       </a:lvl9pPr>
     </p:otherStyle>
   </p:txStyles>
-  <p:extLst mod="1">
+  <p:extLst>
     <p:ext uri="{27BBF7A9-308A-43DC-89C8-2F10F3537804}">
       <p15:sldGuideLst xmlns:p15="http://schemas.microsoft.com/office/powerpoint/2012/main">
         <p15:guide id="2" orient="horz" pos="192">
@@ -8368,7 +8368,7 @@
       </a:lvl9pPr>
     </p:otherStyle>
   </p:txStyles>
-  <p:extLst mod="1">
+  <p:extLst>
     <p:ext uri="{27BBF7A9-308A-43DC-89C8-2F10F3537804}">
       <p15:sldGuideLst xmlns:p15="http://schemas.microsoft.com/office/powerpoint/2012/main">
         <p15:guide id="1" orient="horz" pos="360">
@@ -9005,7 +9005,7 @@
       </a:lvl9pPr>
     </p:otherStyle>
   </p:txStyles>
-  <p:extLst mod="1">
+  <p:extLst>
     <p:ext uri="{27BBF7A9-308A-43DC-89C8-2F10F3537804}">
       <p15:sldGuideLst xmlns:p15="http://schemas.microsoft.com/office/powerpoint/2012/main">
         <p15:guide id="2" orient="horz" pos="192">
@@ -14870,7 +14870,7 @@
               </a:lnSpc>
             </a:pPr>
             <a:r>
-              <a:rPr lang="en-US" altLang="en-US" sz="1600" b="1" i="1" noProof="0" dirty="0">
+              <a:rPr lang="en-US" altLang="en-US" b="1" i="1" noProof="0" dirty="0">
                 <a:solidFill>
                   <a:schemeClr val="tx1"/>
                 </a:solidFill>
@@ -14880,7 +14880,7 @@
               <a:t>Creational patterns</a:t>
             </a:r>
             <a:r>
-              <a:rPr lang="en-US" altLang="en-US" sz="1600" noProof="0" dirty="0">
+              <a:rPr lang="en-US" altLang="en-US" noProof="0" dirty="0">
                 <a:solidFill>
                   <a:schemeClr val="tx1"/>
                 </a:solidFill>
@@ -14903,7 +14903,7 @@
               </a:spcAft>
             </a:pPr>
             <a:r>
-              <a:rPr lang="en-US" altLang="en-US" sz="1200" b="1" noProof="0" dirty="0">
+              <a:rPr lang="en-US" altLang="en-US" sz="1600" b="1" noProof="0" dirty="0">
                 <a:solidFill>
                   <a:schemeClr val="tx1"/>
                 </a:solidFill>
@@ -14913,7 +14913,7 @@
               <a:t>Abstract factory pattern:</a:t>
             </a:r>
             <a:r>
-              <a:rPr lang="en-US" altLang="en-US" sz="1200" noProof="0" dirty="0">
+              <a:rPr lang="en-US" altLang="en-US" sz="1600" noProof="0" dirty="0">
                 <a:solidFill>
                   <a:schemeClr val="tx1"/>
                 </a:solidFill>
@@ -14936,20 +14936,20 @@
               </a:spcAft>
             </a:pPr>
             <a:r>
-              <a:rPr lang="en-US" sz="1200" b="1" noProof="0" dirty="0">
+              <a:rPr lang="en-US" sz="1600" b="1" noProof="0" dirty="0">
                 <a:latin typeface="Times New Roman" panose="02020603050405020304" pitchFamily="18" charset="0"/>
                 <a:cs typeface="Times New Roman" panose="02020603050405020304" pitchFamily="18" charset="0"/>
               </a:rPr>
               <a:t>Builder pattern: </a:t>
             </a:r>
             <a:r>
-              <a:rPr lang="en-US" sz="1200" noProof="0" dirty="0">
+              <a:rPr lang="en-US" sz="1600" noProof="0" dirty="0">
                 <a:latin typeface="Times New Roman" panose="02020603050405020304" pitchFamily="18" charset="0"/>
                 <a:cs typeface="Times New Roman" panose="02020603050405020304" pitchFamily="18" charset="0"/>
               </a:rPr>
               <a:t>separates the construction of a complex object from its representation.</a:t>
             </a:r>
-            <a:endParaRPr lang="en-US" altLang="en-US" sz="1200" noProof="0" dirty="0">
+            <a:endParaRPr lang="en-US" altLang="en-US" sz="1600" noProof="0" dirty="0">
               <a:solidFill>
                 <a:schemeClr val="tx1"/>
               </a:solidFill>
@@ -14971,13 +14971,13 @@
         </p:nvSpPr>
         <p:spPr>
           <a:xfrm>
-            <a:off x="342900" y="2689934"/>
+            <a:off x="342900" y="3006455"/>
             <a:ext cx="8458200" cy="1358283"/>
           </a:xfrm>
         </p:spPr>
         <p:txBody>
           <a:bodyPr>
-            <a:normAutofit/>
+            <a:normAutofit fontScale="92500" lnSpcReduction="10000"/>
           </a:bodyPr>
           <a:lstStyle/>
           <a:p>
@@ -14987,7 +14987,7 @@
               </a:lnSpc>
             </a:pPr>
             <a:r>
-              <a:rPr lang="en-US" altLang="en-US" sz="1600" b="1" i="1" noProof="0" dirty="0">
+              <a:rPr lang="en-US" altLang="en-US" b="1" i="1" noProof="0" dirty="0">
                 <a:solidFill>
                   <a:schemeClr val="tx1"/>
                 </a:solidFill>
@@ -14997,7 +14997,7 @@
               <a:t>Structural patterns</a:t>
             </a:r>
             <a:r>
-              <a:rPr lang="en-US" altLang="en-US" sz="1600" noProof="0" dirty="0">
+              <a:rPr lang="en-US" altLang="en-US" noProof="0" dirty="0">
                 <a:solidFill>
                   <a:schemeClr val="tx1"/>
                 </a:solidFill>
@@ -15020,7 +15020,7 @@
               </a:spcAft>
             </a:pPr>
             <a:r>
-              <a:rPr lang="en-US" altLang="en-US" sz="1200" b="1" noProof="0" dirty="0">
+              <a:rPr lang="en-US" altLang="en-US" sz="1600" b="1" noProof="0" dirty="0">
                 <a:solidFill>
                   <a:schemeClr val="tx1"/>
                 </a:solidFill>
@@ -15030,7 +15030,7 @@
               <a:t>Adapter pattern:</a:t>
             </a:r>
             <a:r>
-              <a:rPr lang="en-US" altLang="en-US" sz="1200" noProof="0" dirty="0">
+              <a:rPr lang="en-US" altLang="en-US" sz="1600" noProof="0" dirty="0">
                 <a:solidFill>
                   <a:schemeClr val="tx1"/>
                 </a:solidFill>
@@ -15053,20 +15053,20 @@
               </a:spcAft>
             </a:pPr>
             <a:r>
-              <a:rPr lang="en-US" sz="1200" b="1" noProof="0" dirty="0">
+              <a:rPr lang="en-US" sz="1600" b="1" noProof="0" dirty="0">
                 <a:latin typeface="Times New Roman" panose="02020603050405020304" pitchFamily="18" charset="0"/>
                 <a:cs typeface="Times New Roman" panose="02020603050405020304" pitchFamily="18" charset="0"/>
               </a:rPr>
               <a:t>Container pattern: </a:t>
             </a:r>
             <a:r>
-              <a:rPr lang="en-US" sz="1200" noProof="0" dirty="0">
+              <a:rPr lang="en-US" sz="1600" noProof="0" dirty="0">
                 <a:latin typeface="Times New Roman" panose="02020603050405020304" pitchFamily="18" charset="0"/>
                 <a:cs typeface="Times New Roman" panose="02020603050405020304" pitchFamily="18" charset="0"/>
               </a:rPr>
               <a:t>create objects for the sole purpose of holding other objects and managing them.</a:t>
             </a:r>
-            <a:endParaRPr lang="en-US" noProof="0" dirty="0"/>
+            <a:endParaRPr lang="en-US" sz="2400" noProof="0" dirty="0"/>
           </a:p>
         </p:txBody>
       </p:sp>
@@ -15082,13 +15082,13 @@
         </p:nvSpPr>
         <p:spPr>
           <a:xfrm>
-            <a:off x="342900" y="4218081"/>
+            <a:off x="342900" y="4780785"/>
             <a:ext cx="8458200" cy="1499138"/>
           </a:xfrm>
         </p:spPr>
         <p:txBody>
           <a:bodyPr>
-            <a:normAutofit/>
+            <a:normAutofit fontScale="85000" lnSpcReduction="10000"/>
           </a:bodyPr>
           <a:lstStyle/>
           <a:p>
@@ -15101,7 +15101,7 @@
               </a:spcBef>
             </a:pPr>
             <a:r>
-              <a:rPr lang="en-US" altLang="en-US" sz="1600" b="1" i="1" noProof="0" dirty="0">
+              <a:rPr lang="en-US" altLang="en-US" b="1" i="1" noProof="0" dirty="0">
                 <a:solidFill>
                   <a:schemeClr val="tx1"/>
                 </a:solidFill>
@@ -15111,7 +15111,7 @@
               <a:t>Behavioral patterns</a:t>
             </a:r>
             <a:r>
-              <a:rPr lang="en-US" altLang="en-US" sz="1600" noProof="0" dirty="0">
+              <a:rPr lang="en-US" altLang="en-US" noProof="0" dirty="0">
                 <a:solidFill>
                   <a:schemeClr val="tx1"/>
                 </a:solidFill>
@@ -15134,7 +15134,7 @@
               </a:spcAft>
             </a:pPr>
             <a:r>
-              <a:rPr lang="en-US" altLang="en-US" sz="1200" b="1" noProof="0" dirty="0">
+              <a:rPr lang="en-US" altLang="en-US" sz="1600" b="1" noProof="0" dirty="0">
                 <a:solidFill>
                   <a:schemeClr val="tx1"/>
                 </a:solidFill>
@@ -15144,7 +15144,7 @@
               <a:t>Chain of responsibility pattern:</a:t>
             </a:r>
             <a:r>
-              <a:rPr lang="en-US" altLang="en-US" sz="1200" noProof="0" dirty="0">
+              <a:rPr lang="en-US" altLang="en-US" sz="1600" noProof="0" dirty="0">
                 <a:solidFill>
                   <a:schemeClr val="tx1"/>
                 </a:solidFill>
@@ -15167,7 +15167,7 @@
               </a:spcAft>
             </a:pPr>
             <a:r>
-              <a:rPr lang="en-US" altLang="en-US" sz="1200" b="1" noProof="0" dirty="0">
+              <a:rPr lang="en-US" altLang="en-US" sz="1600" b="1" noProof="0" dirty="0">
                 <a:solidFill>
                   <a:schemeClr val="tx1"/>
                 </a:solidFill>
@@ -15177,7 +15177,7 @@
               <a:t>Command pattern:</a:t>
             </a:r>
             <a:r>
-              <a:rPr lang="en-US" altLang="en-US" sz="1200" noProof="0" dirty="0">
+              <a:rPr lang="en-US" altLang="en-US" sz="1600" noProof="0" dirty="0">
                 <a:solidFill>
                   <a:schemeClr val="tx1"/>
                 </a:solidFill>
@@ -15186,7 +15186,7 @@
               </a:rPr>
               <a:t> Command objects encapsulate an action and its parameters.</a:t>
             </a:r>
-            <a:endParaRPr lang="en-US" noProof="0" dirty="0"/>
+            <a:endParaRPr lang="en-US" sz="2400" noProof="0" dirty="0"/>
           </a:p>
         </p:txBody>
       </p:sp>

</xml_diff>